<commit_message>
updated datasets and corrmatrix
</commit_message>
<xml_diff>
--- a/mar2update.pptx
+++ b/mar2update.pptx
@@ -29,6 +29,7 @@
     <p:sldId id="285" r:id="rId23"/>
     <p:sldId id="286" r:id="rId24"/>
     <p:sldId id="287" r:id="rId25"/>
+    <p:sldId id="289" r:id="rId26"/>
   </p:sldIdLst>
   <p:sldSz cx="12192000" cy="6858000"/>
   <p:notesSz cx="6858000" cy="9144000"/>
@@ -282,7 +283,7 @@
           <a:p>
             <a:fld id="{90BB96C0-A26B-4B1D-8AD9-6B4BA5C45B62}" type="datetimeFigureOut">
               <a:rPr lang="en-US" smtClean="0"/>
-              <a:t>3/2/2023</a:t>
+              <a:t>3/8/2023</a:t>
             </a:fld>
             <a:endParaRPr lang="en-US"/>
           </a:p>
@@ -480,7 +481,7 @@
           <a:p>
             <a:fld id="{90BB96C0-A26B-4B1D-8AD9-6B4BA5C45B62}" type="datetimeFigureOut">
               <a:rPr lang="en-US" smtClean="0"/>
-              <a:t>3/2/2023</a:t>
+              <a:t>3/8/2023</a:t>
             </a:fld>
             <a:endParaRPr lang="en-US"/>
           </a:p>
@@ -688,7 +689,7 @@
           <a:p>
             <a:fld id="{90BB96C0-A26B-4B1D-8AD9-6B4BA5C45B62}" type="datetimeFigureOut">
               <a:rPr lang="en-US" smtClean="0"/>
-              <a:t>3/2/2023</a:t>
+              <a:t>3/8/2023</a:t>
             </a:fld>
             <a:endParaRPr lang="en-US"/>
           </a:p>
@@ -886,7 +887,7 @@
           <a:p>
             <a:fld id="{90BB96C0-A26B-4B1D-8AD9-6B4BA5C45B62}" type="datetimeFigureOut">
               <a:rPr lang="en-US" smtClean="0"/>
-              <a:t>3/2/2023</a:t>
+              <a:t>3/8/2023</a:t>
             </a:fld>
             <a:endParaRPr lang="en-US"/>
           </a:p>
@@ -1161,7 +1162,7 @@
           <a:p>
             <a:fld id="{90BB96C0-A26B-4B1D-8AD9-6B4BA5C45B62}" type="datetimeFigureOut">
               <a:rPr lang="en-US" smtClean="0"/>
-              <a:t>3/2/2023</a:t>
+              <a:t>3/8/2023</a:t>
             </a:fld>
             <a:endParaRPr lang="en-US"/>
           </a:p>
@@ -1426,7 +1427,7 @@
           <a:p>
             <a:fld id="{90BB96C0-A26B-4B1D-8AD9-6B4BA5C45B62}" type="datetimeFigureOut">
               <a:rPr lang="en-US" smtClean="0"/>
-              <a:t>3/2/2023</a:t>
+              <a:t>3/8/2023</a:t>
             </a:fld>
             <a:endParaRPr lang="en-US"/>
           </a:p>
@@ -1838,7 +1839,7 @@
           <a:p>
             <a:fld id="{90BB96C0-A26B-4B1D-8AD9-6B4BA5C45B62}" type="datetimeFigureOut">
               <a:rPr lang="en-US" smtClean="0"/>
-              <a:t>3/2/2023</a:t>
+              <a:t>3/8/2023</a:t>
             </a:fld>
             <a:endParaRPr lang="en-US"/>
           </a:p>
@@ -1979,7 +1980,7 @@
           <a:p>
             <a:fld id="{90BB96C0-A26B-4B1D-8AD9-6B4BA5C45B62}" type="datetimeFigureOut">
               <a:rPr lang="en-US" smtClean="0"/>
-              <a:t>3/2/2023</a:t>
+              <a:t>3/8/2023</a:t>
             </a:fld>
             <a:endParaRPr lang="en-US"/>
           </a:p>
@@ -2092,7 +2093,7 @@
           <a:p>
             <a:fld id="{90BB96C0-A26B-4B1D-8AD9-6B4BA5C45B62}" type="datetimeFigureOut">
               <a:rPr lang="en-US" smtClean="0"/>
-              <a:t>3/2/2023</a:t>
+              <a:t>3/8/2023</a:t>
             </a:fld>
             <a:endParaRPr lang="en-US"/>
           </a:p>
@@ -2403,7 +2404,7 @@
           <a:p>
             <a:fld id="{90BB96C0-A26B-4B1D-8AD9-6B4BA5C45B62}" type="datetimeFigureOut">
               <a:rPr lang="en-US" smtClean="0"/>
-              <a:t>3/2/2023</a:t>
+              <a:t>3/8/2023</a:t>
             </a:fld>
             <a:endParaRPr lang="en-US"/>
           </a:p>
@@ -2691,7 +2692,7 @@
           <a:p>
             <a:fld id="{90BB96C0-A26B-4B1D-8AD9-6B4BA5C45B62}" type="datetimeFigureOut">
               <a:rPr lang="en-US" smtClean="0"/>
-              <a:t>3/2/2023</a:t>
+              <a:t>3/8/2023</a:t>
             </a:fld>
             <a:endParaRPr lang="en-US"/>
           </a:p>
@@ -2932,7 +2933,7 @@
           <a:p>
             <a:fld id="{90BB96C0-A26B-4B1D-8AD9-6B4BA5C45B62}" type="datetimeFigureOut">
               <a:rPr lang="en-US" smtClean="0"/>
-              <a:t>3/2/2023</a:t>
+              <a:t>3/8/2023</a:t>
             </a:fld>
             <a:endParaRPr lang="en-US"/>
           </a:p>
@@ -10855,625 +10856,6 @@
   <p:clrMapOvr>
     <a:masterClrMapping/>
   </p:clrMapOvr>
-  <p:timing>
-    <p:tnLst>
-      <p:par>
-        <p:cTn id="1" dur="indefinite" restart="never" nodeType="tmRoot">
-          <p:childTnLst>
-            <p:seq concurrent="1" nextAc="seek">
-              <p:cTn id="2" dur="indefinite" nodeType="mainSeq">
-                <p:childTnLst>
-                  <p:par>
-                    <p:cTn id="3" fill="hold">
-                      <p:stCondLst>
-                        <p:cond delay="indefinite"/>
-                      </p:stCondLst>
-                      <p:childTnLst>
-                        <p:par>
-                          <p:cTn id="4" fill="hold">
-                            <p:stCondLst>
-                              <p:cond delay="0"/>
-                            </p:stCondLst>
-                            <p:childTnLst>
-                              <p:par>
-                                <p:cTn id="5" presetID="1" presetClass="entr" presetSubtype="0" fill="hold" nodeType="clickEffect">
-                                  <p:stCondLst>
-                                    <p:cond delay="0"/>
-                                  </p:stCondLst>
-                                  <p:childTnLst>
-                                    <p:set>
-                                      <p:cBhvr>
-                                        <p:cTn id="6" dur="1" fill="hold">
-                                          <p:stCondLst>
-                                            <p:cond delay="0"/>
-                                          </p:stCondLst>
-                                        </p:cTn>
-                                        <p:tgtEl>
-                                          <p:spTgt spid="51"/>
-                                        </p:tgtEl>
-                                        <p:attrNameLst>
-                                          <p:attrName>style.visibility</p:attrName>
-                                        </p:attrNameLst>
-                                      </p:cBhvr>
-                                      <p:to>
-                                        <p:strVal val="visible"/>
-                                      </p:to>
-                                    </p:set>
-                                  </p:childTnLst>
-                                </p:cTn>
-                              </p:par>
-                              <p:par>
-                                <p:cTn id="7" presetID="1" presetClass="entr" presetSubtype="0" fill="hold" nodeType="withEffect">
-                                  <p:stCondLst>
-                                    <p:cond delay="0"/>
-                                  </p:stCondLst>
-                                  <p:childTnLst>
-                                    <p:set>
-                                      <p:cBhvr>
-                                        <p:cTn id="8" dur="1" fill="hold">
-                                          <p:stCondLst>
-                                            <p:cond delay="0"/>
-                                          </p:stCondLst>
-                                        </p:cTn>
-                                        <p:tgtEl>
-                                          <p:spTgt spid="52"/>
-                                        </p:tgtEl>
-                                        <p:attrNameLst>
-                                          <p:attrName>style.visibility</p:attrName>
-                                        </p:attrNameLst>
-                                      </p:cBhvr>
-                                      <p:to>
-                                        <p:strVal val="visible"/>
-                                      </p:to>
-                                    </p:set>
-                                  </p:childTnLst>
-                                </p:cTn>
-                              </p:par>
-                              <p:par>
-                                <p:cTn id="9" presetID="1" presetClass="entr" presetSubtype="0" fill="hold" nodeType="withEffect">
-                                  <p:stCondLst>
-                                    <p:cond delay="0"/>
-                                  </p:stCondLst>
-                                  <p:childTnLst>
-                                    <p:set>
-                                      <p:cBhvr>
-                                        <p:cTn id="10" dur="1" fill="hold">
-                                          <p:stCondLst>
-                                            <p:cond delay="0"/>
-                                          </p:stCondLst>
-                                        </p:cTn>
-                                        <p:tgtEl>
-                                          <p:spTgt spid="53"/>
-                                        </p:tgtEl>
-                                        <p:attrNameLst>
-                                          <p:attrName>style.visibility</p:attrName>
-                                        </p:attrNameLst>
-                                      </p:cBhvr>
-                                      <p:to>
-                                        <p:strVal val="visible"/>
-                                      </p:to>
-                                    </p:set>
-                                  </p:childTnLst>
-                                </p:cTn>
-                              </p:par>
-                              <p:par>
-                                <p:cTn id="11" presetID="1" presetClass="entr" presetSubtype="0" fill="hold" grpId="0" nodeType="withEffect">
-                                  <p:stCondLst>
-                                    <p:cond delay="0"/>
-                                  </p:stCondLst>
-                                  <p:childTnLst>
-                                    <p:set>
-                                      <p:cBhvr>
-                                        <p:cTn id="12" dur="1" fill="hold">
-                                          <p:stCondLst>
-                                            <p:cond delay="0"/>
-                                          </p:stCondLst>
-                                        </p:cTn>
-                                        <p:tgtEl>
-                                          <p:spTgt spid="54"/>
-                                        </p:tgtEl>
-                                        <p:attrNameLst>
-                                          <p:attrName>style.visibility</p:attrName>
-                                        </p:attrNameLst>
-                                      </p:cBhvr>
-                                      <p:to>
-                                        <p:strVal val="visible"/>
-                                      </p:to>
-                                    </p:set>
-                                  </p:childTnLst>
-                                </p:cTn>
-                              </p:par>
-                              <p:par>
-                                <p:cTn id="13" presetID="1" presetClass="entr" presetSubtype="0" fill="hold" grpId="0" nodeType="withEffect">
-                                  <p:stCondLst>
-                                    <p:cond delay="0"/>
-                                  </p:stCondLst>
-                                  <p:childTnLst>
-                                    <p:set>
-                                      <p:cBhvr>
-                                        <p:cTn id="14" dur="1" fill="hold">
-                                          <p:stCondLst>
-                                            <p:cond delay="0"/>
-                                          </p:stCondLst>
-                                        </p:cTn>
-                                        <p:tgtEl>
-                                          <p:spTgt spid="55"/>
-                                        </p:tgtEl>
-                                        <p:attrNameLst>
-                                          <p:attrName>style.visibility</p:attrName>
-                                        </p:attrNameLst>
-                                      </p:cBhvr>
-                                      <p:to>
-                                        <p:strVal val="visible"/>
-                                      </p:to>
-                                    </p:set>
-                                  </p:childTnLst>
-                                </p:cTn>
-                              </p:par>
-                              <p:par>
-                                <p:cTn id="15" presetID="1" presetClass="entr" presetSubtype="0" fill="hold" grpId="0" nodeType="withEffect">
-                                  <p:stCondLst>
-                                    <p:cond delay="0"/>
-                                  </p:stCondLst>
-                                  <p:childTnLst>
-                                    <p:set>
-                                      <p:cBhvr>
-                                        <p:cTn id="16" dur="1" fill="hold">
-                                          <p:stCondLst>
-                                            <p:cond delay="0"/>
-                                          </p:stCondLst>
-                                        </p:cTn>
-                                        <p:tgtEl>
-                                          <p:spTgt spid="56"/>
-                                        </p:tgtEl>
-                                        <p:attrNameLst>
-                                          <p:attrName>style.visibility</p:attrName>
-                                        </p:attrNameLst>
-                                      </p:cBhvr>
-                                      <p:to>
-                                        <p:strVal val="visible"/>
-                                      </p:to>
-                                    </p:set>
-                                  </p:childTnLst>
-                                </p:cTn>
-                              </p:par>
-                              <p:par>
-                                <p:cTn id="17" presetID="1" presetClass="entr" presetSubtype="0" fill="hold" grpId="0" nodeType="withEffect">
-                                  <p:stCondLst>
-                                    <p:cond delay="0"/>
-                                  </p:stCondLst>
-                                  <p:childTnLst>
-                                    <p:set>
-                                      <p:cBhvr>
-                                        <p:cTn id="18" dur="1" fill="hold">
-                                          <p:stCondLst>
-                                            <p:cond delay="0"/>
-                                          </p:stCondLst>
-                                        </p:cTn>
-                                        <p:tgtEl>
-                                          <p:spTgt spid="57"/>
-                                        </p:tgtEl>
-                                        <p:attrNameLst>
-                                          <p:attrName>style.visibility</p:attrName>
-                                        </p:attrNameLst>
-                                      </p:cBhvr>
-                                      <p:to>
-                                        <p:strVal val="visible"/>
-                                      </p:to>
-                                    </p:set>
-                                  </p:childTnLst>
-                                </p:cTn>
-                              </p:par>
-                              <p:par>
-                                <p:cTn id="19" presetID="1" presetClass="entr" presetSubtype="0" fill="hold" grpId="0" nodeType="withEffect">
-                                  <p:stCondLst>
-                                    <p:cond delay="0"/>
-                                  </p:stCondLst>
-                                  <p:childTnLst>
-                                    <p:set>
-                                      <p:cBhvr>
-                                        <p:cTn id="20" dur="1" fill="hold">
-                                          <p:stCondLst>
-                                            <p:cond delay="0"/>
-                                          </p:stCondLst>
-                                        </p:cTn>
-                                        <p:tgtEl>
-                                          <p:spTgt spid="58"/>
-                                        </p:tgtEl>
-                                        <p:attrNameLst>
-                                          <p:attrName>style.visibility</p:attrName>
-                                        </p:attrNameLst>
-                                      </p:cBhvr>
-                                      <p:to>
-                                        <p:strVal val="visible"/>
-                                      </p:to>
-                                    </p:set>
-                                  </p:childTnLst>
-                                </p:cTn>
-                              </p:par>
-                              <p:par>
-                                <p:cTn id="21" presetID="1" presetClass="entr" presetSubtype="0" fill="hold" nodeType="withEffect">
-                                  <p:stCondLst>
-                                    <p:cond delay="0"/>
-                                  </p:stCondLst>
-                                  <p:childTnLst>
-                                    <p:set>
-                                      <p:cBhvr>
-                                        <p:cTn id="22" dur="1" fill="hold">
-                                          <p:stCondLst>
-                                            <p:cond delay="0"/>
-                                          </p:stCondLst>
-                                        </p:cTn>
-                                        <p:tgtEl>
-                                          <p:spTgt spid="62"/>
-                                        </p:tgtEl>
-                                        <p:attrNameLst>
-                                          <p:attrName>style.visibility</p:attrName>
-                                        </p:attrNameLst>
-                                      </p:cBhvr>
-                                      <p:to>
-                                        <p:strVal val="visible"/>
-                                      </p:to>
-                                    </p:set>
-                                  </p:childTnLst>
-                                </p:cTn>
-                              </p:par>
-                              <p:par>
-                                <p:cTn id="23" presetID="1" presetClass="entr" presetSubtype="0" fill="hold" nodeType="withEffect">
-                                  <p:stCondLst>
-                                    <p:cond delay="0"/>
-                                  </p:stCondLst>
-                                  <p:childTnLst>
-                                    <p:set>
-                                      <p:cBhvr>
-                                        <p:cTn id="24" dur="1" fill="hold">
-                                          <p:stCondLst>
-                                            <p:cond delay="0"/>
-                                          </p:stCondLst>
-                                        </p:cTn>
-                                        <p:tgtEl>
-                                          <p:spTgt spid="61"/>
-                                        </p:tgtEl>
-                                        <p:attrNameLst>
-                                          <p:attrName>style.visibility</p:attrName>
-                                        </p:attrNameLst>
-                                      </p:cBhvr>
-                                      <p:to>
-                                        <p:strVal val="visible"/>
-                                      </p:to>
-                                    </p:set>
-                                  </p:childTnLst>
-                                </p:cTn>
-                              </p:par>
-                              <p:par>
-                                <p:cTn id="25" presetID="1" presetClass="entr" presetSubtype="0" fill="hold" nodeType="withEffect">
-                                  <p:stCondLst>
-                                    <p:cond delay="0"/>
-                                  </p:stCondLst>
-                                  <p:childTnLst>
-                                    <p:set>
-                                      <p:cBhvr>
-                                        <p:cTn id="26" dur="1" fill="hold">
-                                          <p:stCondLst>
-                                            <p:cond delay="0"/>
-                                          </p:stCondLst>
-                                        </p:cTn>
-                                        <p:tgtEl>
-                                          <p:spTgt spid="59"/>
-                                        </p:tgtEl>
-                                        <p:attrNameLst>
-                                          <p:attrName>style.visibility</p:attrName>
-                                        </p:attrNameLst>
-                                      </p:cBhvr>
-                                      <p:to>
-                                        <p:strVal val="visible"/>
-                                      </p:to>
-                                    </p:set>
-                                  </p:childTnLst>
-                                </p:cTn>
-                              </p:par>
-                              <p:par>
-                                <p:cTn id="27" presetID="1" presetClass="entr" presetSubtype="0" fill="hold" nodeType="withEffect">
-                                  <p:stCondLst>
-                                    <p:cond delay="0"/>
-                                  </p:stCondLst>
-                                  <p:childTnLst>
-                                    <p:set>
-                                      <p:cBhvr>
-                                        <p:cTn id="28" dur="1" fill="hold">
-                                          <p:stCondLst>
-                                            <p:cond delay="0"/>
-                                          </p:stCondLst>
-                                        </p:cTn>
-                                        <p:tgtEl>
-                                          <p:spTgt spid="60"/>
-                                        </p:tgtEl>
-                                        <p:attrNameLst>
-                                          <p:attrName>style.visibility</p:attrName>
-                                        </p:attrNameLst>
-                                      </p:cBhvr>
-                                      <p:to>
-                                        <p:strVal val="visible"/>
-                                      </p:to>
-                                    </p:set>
-                                  </p:childTnLst>
-                                </p:cTn>
-                              </p:par>
-                            </p:childTnLst>
-                          </p:cTn>
-                        </p:par>
-                      </p:childTnLst>
-                    </p:cTn>
-                  </p:par>
-                  <p:par>
-                    <p:cTn id="29" fill="hold">
-                      <p:stCondLst>
-                        <p:cond delay="indefinite"/>
-                      </p:stCondLst>
-                      <p:childTnLst>
-                        <p:par>
-                          <p:cTn id="30" fill="hold">
-                            <p:stCondLst>
-                              <p:cond delay="0"/>
-                            </p:stCondLst>
-                            <p:childTnLst>
-                              <p:par>
-                                <p:cTn id="31" presetID="1" presetClass="entr" presetSubtype="0" fill="hold" grpId="0" nodeType="clickEffect">
-                                  <p:stCondLst>
-                                    <p:cond delay="0"/>
-                                  </p:stCondLst>
-                                  <p:childTnLst>
-                                    <p:set>
-                                      <p:cBhvr>
-                                        <p:cTn id="32" dur="1" fill="hold">
-                                          <p:stCondLst>
-                                            <p:cond delay="0"/>
-                                          </p:stCondLst>
-                                        </p:cTn>
-                                        <p:tgtEl>
-                                          <p:spTgt spid="63"/>
-                                        </p:tgtEl>
-                                        <p:attrNameLst>
-                                          <p:attrName>style.visibility</p:attrName>
-                                        </p:attrNameLst>
-                                      </p:cBhvr>
-                                      <p:to>
-                                        <p:strVal val="visible"/>
-                                      </p:to>
-                                    </p:set>
-                                  </p:childTnLst>
-                                </p:cTn>
-                              </p:par>
-                              <p:par>
-                                <p:cTn id="33" presetID="1" presetClass="entr" presetSubtype="0" fill="hold" nodeType="withEffect">
-                                  <p:stCondLst>
-                                    <p:cond delay="0"/>
-                                  </p:stCondLst>
-                                  <p:childTnLst>
-                                    <p:set>
-                                      <p:cBhvr>
-                                        <p:cTn id="34" dur="1" fill="hold">
-                                          <p:stCondLst>
-                                            <p:cond delay="0"/>
-                                          </p:stCondLst>
-                                        </p:cTn>
-                                        <p:tgtEl>
-                                          <p:spTgt spid="64"/>
-                                        </p:tgtEl>
-                                        <p:attrNameLst>
-                                          <p:attrName>style.visibility</p:attrName>
-                                        </p:attrNameLst>
-                                      </p:cBhvr>
-                                      <p:to>
-                                        <p:strVal val="visible"/>
-                                      </p:to>
-                                    </p:set>
-                                  </p:childTnLst>
-                                </p:cTn>
-                              </p:par>
-                              <p:par>
-                                <p:cTn id="35" presetID="1" presetClass="entr" presetSubtype="0" fill="hold" nodeType="withEffect">
-                                  <p:stCondLst>
-                                    <p:cond delay="0"/>
-                                  </p:stCondLst>
-                                  <p:childTnLst>
-                                    <p:set>
-                                      <p:cBhvr>
-                                        <p:cTn id="36" dur="1" fill="hold">
-                                          <p:stCondLst>
-                                            <p:cond delay="0"/>
-                                          </p:stCondLst>
-                                        </p:cTn>
-                                        <p:tgtEl>
-                                          <p:spTgt spid="65"/>
-                                        </p:tgtEl>
-                                        <p:attrNameLst>
-                                          <p:attrName>style.visibility</p:attrName>
-                                        </p:attrNameLst>
-                                      </p:cBhvr>
-                                      <p:to>
-                                        <p:strVal val="visible"/>
-                                      </p:to>
-                                    </p:set>
-                                  </p:childTnLst>
-                                </p:cTn>
-                              </p:par>
-                              <p:par>
-                                <p:cTn id="37" presetID="1" presetClass="entr" presetSubtype="0" fill="hold" grpId="0" nodeType="withEffect">
-                                  <p:stCondLst>
-                                    <p:cond delay="0"/>
-                                  </p:stCondLst>
-                                  <p:childTnLst>
-                                    <p:set>
-                                      <p:cBhvr>
-                                        <p:cTn id="38" dur="1" fill="hold">
-                                          <p:stCondLst>
-                                            <p:cond delay="0"/>
-                                          </p:stCondLst>
-                                        </p:cTn>
-                                        <p:tgtEl>
-                                          <p:spTgt spid="66"/>
-                                        </p:tgtEl>
-                                        <p:attrNameLst>
-                                          <p:attrName>style.visibility</p:attrName>
-                                        </p:attrNameLst>
-                                      </p:cBhvr>
-                                      <p:to>
-                                        <p:strVal val="visible"/>
-                                      </p:to>
-                                    </p:set>
-                                  </p:childTnLst>
-                                </p:cTn>
-                              </p:par>
-                              <p:par>
-                                <p:cTn id="39" presetID="1" presetClass="entr" presetSubtype="0" fill="hold" grpId="0" nodeType="withEffect">
-                                  <p:stCondLst>
-                                    <p:cond delay="0"/>
-                                  </p:stCondLst>
-                                  <p:childTnLst>
-                                    <p:set>
-                                      <p:cBhvr>
-                                        <p:cTn id="40" dur="1" fill="hold">
-                                          <p:stCondLst>
-                                            <p:cond delay="0"/>
-                                          </p:stCondLst>
-                                        </p:cTn>
-                                        <p:tgtEl>
-                                          <p:spTgt spid="67"/>
-                                        </p:tgtEl>
-                                        <p:attrNameLst>
-                                          <p:attrName>style.visibility</p:attrName>
-                                        </p:attrNameLst>
-                                      </p:cBhvr>
-                                      <p:to>
-                                        <p:strVal val="visible"/>
-                                      </p:to>
-                                    </p:set>
-                                  </p:childTnLst>
-                                </p:cTn>
-                              </p:par>
-                              <p:par>
-                                <p:cTn id="41" presetID="1" presetClass="entr" presetSubtype="0" fill="hold" grpId="0" nodeType="withEffect">
-                                  <p:stCondLst>
-                                    <p:cond delay="0"/>
-                                  </p:stCondLst>
-                                  <p:childTnLst>
-                                    <p:set>
-                                      <p:cBhvr>
-                                        <p:cTn id="42" dur="1" fill="hold">
-                                          <p:stCondLst>
-                                            <p:cond delay="0"/>
-                                          </p:stCondLst>
-                                        </p:cTn>
-                                        <p:tgtEl>
-                                          <p:spTgt spid="72"/>
-                                        </p:tgtEl>
-                                        <p:attrNameLst>
-                                          <p:attrName>style.visibility</p:attrName>
-                                        </p:attrNameLst>
-                                      </p:cBhvr>
-                                      <p:to>
-                                        <p:strVal val="visible"/>
-                                      </p:to>
-                                    </p:set>
-                                  </p:childTnLst>
-                                </p:cTn>
-                              </p:par>
-                              <p:par>
-                                <p:cTn id="43" presetID="1" presetClass="entr" presetSubtype="0" fill="hold" grpId="0" nodeType="withEffect">
-                                  <p:stCondLst>
-                                    <p:cond delay="0"/>
-                                  </p:stCondLst>
-                                  <p:childTnLst>
-                                    <p:set>
-                                      <p:cBhvr>
-                                        <p:cTn id="44" dur="1" fill="hold">
-                                          <p:stCondLst>
-                                            <p:cond delay="0"/>
-                                          </p:stCondLst>
-                                        </p:cTn>
-                                        <p:tgtEl>
-                                          <p:spTgt spid="73"/>
-                                        </p:tgtEl>
-                                        <p:attrNameLst>
-                                          <p:attrName>style.visibility</p:attrName>
-                                        </p:attrNameLst>
-                                      </p:cBhvr>
-                                      <p:to>
-                                        <p:strVal val="visible"/>
-                                      </p:to>
-                                    </p:set>
-                                  </p:childTnLst>
-                                </p:cTn>
-                              </p:par>
-                              <p:par>
-                                <p:cTn id="45" presetID="1" presetClass="entr" presetSubtype="0" fill="hold" grpId="0" nodeType="withEffect">
-                                  <p:stCondLst>
-                                    <p:cond delay="0"/>
-                                  </p:stCondLst>
-                                  <p:childTnLst>
-                                    <p:set>
-                                      <p:cBhvr>
-                                        <p:cTn id="46" dur="1" fill="hold">
-                                          <p:stCondLst>
-                                            <p:cond delay="0"/>
-                                          </p:stCondLst>
-                                        </p:cTn>
-                                        <p:tgtEl>
-                                          <p:spTgt spid="18"/>
-                                        </p:tgtEl>
-                                        <p:attrNameLst>
-                                          <p:attrName>style.visibility</p:attrName>
-                                        </p:attrNameLst>
-                                      </p:cBhvr>
-                                      <p:to>
-                                        <p:strVal val="visible"/>
-                                      </p:to>
-                                    </p:set>
-                                  </p:childTnLst>
-                                </p:cTn>
-                              </p:par>
-                            </p:childTnLst>
-                          </p:cTn>
-                        </p:par>
-                      </p:childTnLst>
-                    </p:cTn>
-                  </p:par>
-                </p:childTnLst>
-              </p:cTn>
-              <p:prevCondLst>
-                <p:cond evt="onPrev" delay="0">
-                  <p:tgtEl>
-                    <p:sldTgt/>
-                  </p:tgtEl>
-                </p:cond>
-              </p:prevCondLst>
-              <p:nextCondLst>
-                <p:cond evt="onNext" delay="0">
-                  <p:tgtEl>
-                    <p:sldTgt/>
-                  </p:tgtEl>
-                </p:cond>
-              </p:nextCondLst>
-            </p:seq>
-          </p:childTnLst>
-        </p:cTn>
-      </p:par>
-    </p:tnLst>
-    <p:bldLst>
-      <p:bldP spid="54" grpId="0"/>
-      <p:bldP spid="55" grpId="0" animBg="1"/>
-      <p:bldP spid="56" grpId="0"/>
-      <p:bldP spid="57" grpId="0"/>
-      <p:bldP spid="58" grpId="0"/>
-      <p:bldP spid="63" grpId="0"/>
-      <p:bldP spid="66" grpId="0"/>
-      <p:bldP spid="67" grpId="0"/>
-      <p:bldP spid="72" grpId="0"/>
-      <p:bldP spid="73" grpId="0" animBg="1"/>
-      <p:bldP spid="18" grpId="0"/>
-    </p:bldLst>
-  </p:timing>
 </p:sld>
 </file>
 
@@ -16133,728 +15515,6 @@
   <p:clrMapOvr>
     <a:masterClrMapping/>
   </p:clrMapOvr>
-  <p:timing>
-    <p:tnLst>
-      <p:par>
-        <p:cTn id="1" dur="indefinite" restart="never" nodeType="tmRoot">
-          <p:childTnLst>
-            <p:seq concurrent="1" nextAc="seek">
-              <p:cTn id="2" dur="indefinite" nodeType="mainSeq">
-                <p:childTnLst>
-                  <p:par>
-                    <p:cTn id="3" fill="hold">
-                      <p:stCondLst>
-                        <p:cond delay="indefinite"/>
-                      </p:stCondLst>
-                      <p:childTnLst>
-                        <p:par>
-                          <p:cTn id="4" fill="hold">
-                            <p:stCondLst>
-                              <p:cond delay="0"/>
-                            </p:stCondLst>
-                            <p:childTnLst>
-                              <p:par>
-                                <p:cTn id="5" presetID="1" presetClass="entr" presetSubtype="0" fill="hold" grpId="0" nodeType="clickEffect">
-                                  <p:stCondLst>
-                                    <p:cond delay="0"/>
-                                  </p:stCondLst>
-                                  <p:childTnLst>
-                                    <p:set>
-                                      <p:cBhvr>
-                                        <p:cTn id="6" dur="1" fill="hold">
-                                          <p:stCondLst>
-                                            <p:cond delay="0"/>
-                                          </p:stCondLst>
-                                        </p:cTn>
-                                        <p:tgtEl>
-                                          <p:spTgt spid="20"/>
-                                        </p:tgtEl>
-                                        <p:attrNameLst>
-                                          <p:attrName>style.visibility</p:attrName>
-                                        </p:attrNameLst>
-                                      </p:cBhvr>
-                                      <p:to>
-                                        <p:strVal val="visible"/>
-                                      </p:to>
-                                    </p:set>
-                                  </p:childTnLst>
-                                </p:cTn>
-                              </p:par>
-                              <p:par>
-                                <p:cTn id="7" presetID="1" presetClass="entr" presetSubtype="0" fill="hold" grpId="0" nodeType="withEffect">
-                                  <p:stCondLst>
-                                    <p:cond delay="0"/>
-                                  </p:stCondLst>
-                                  <p:childTnLst>
-                                    <p:set>
-                                      <p:cBhvr>
-                                        <p:cTn id="8" dur="1" fill="hold">
-                                          <p:stCondLst>
-                                            <p:cond delay="0"/>
-                                          </p:stCondLst>
-                                        </p:cTn>
-                                        <p:tgtEl>
-                                          <p:spTgt spid="21"/>
-                                        </p:tgtEl>
-                                        <p:attrNameLst>
-                                          <p:attrName>style.visibility</p:attrName>
-                                        </p:attrNameLst>
-                                      </p:cBhvr>
-                                      <p:to>
-                                        <p:strVal val="visible"/>
-                                      </p:to>
-                                    </p:set>
-                                  </p:childTnLst>
-                                </p:cTn>
-                              </p:par>
-                              <p:par>
-                                <p:cTn id="9" presetID="1" presetClass="entr" presetSubtype="0" fill="hold" grpId="0" nodeType="withEffect">
-                                  <p:stCondLst>
-                                    <p:cond delay="0"/>
-                                  </p:stCondLst>
-                                  <p:childTnLst>
-                                    <p:set>
-                                      <p:cBhvr>
-                                        <p:cTn id="10" dur="1" fill="hold">
-                                          <p:stCondLst>
-                                            <p:cond delay="0"/>
-                                          </p:stCondLst>
-                                        </p:cTn>
-                                        <p:tgtEl>
-                                          <p:spTgt spid="23"/>
-                                        </p:tgtEl>
-                                        <p:attrNameLst>
-                                          <p:attrName>style.visibility</p:attrName>
-                                        </p:attrNameLst>
-                                      </p:cBhvr>
-                                      <p:to>
-                                        <p:strVal val="visible"/>
-                                      </p:to>
-                                    </p:set>
-                                  </p:childTnLst>
-                                </p:cTn>
-                              </p:par>
-                              <p:par>
-                                <p:cTn id="11" presetID="1" presetClass="entr" presetSubtype="0" fill="hold" grpId="0" nodeType="withEffect">
-                                  <p:stCondLst>
-                                    <p:cond delay="0"/>
-                                  </p:stCondLst>
-                                  <p:childTnLst>
-                                    <p:set>
-                                      <p:cBhvr>
-                                        <p:cTn id="12" dur="1" fill="hold">
-                                          <p:stCondLst>
-                                            <p:cond delay="0"/>
-                                          </p:stCondLst>
-                                        </p:cTn>
-                                        <p:tgtEl>
-                                          <p:spTgt spid="25"/>
-                                        </p:tgtEl>
-                                        <p:attrNameLst>
-                                          <p:attrName>style.visibility</p:attrName>
-                                        </p:attrNameLst>
-                                      </p:cBhvr>
-                                      <p:to>
-                                        <p:strVal val="visible"/>
-                                      </p:to>
-                                    </p:set>
-                                  </p:childTnLst>
-                                </p:cTn>
-                              </p:par>
-                              <p:par>
-                                <p:cTn id="13" presetID="1" presetClass="entr" presetSubtype="0" fill="hold" grpId="0" nodeType="withEffect">
-                                  <p:stCondLst>
-                                    <p:cond delay="0"/>
-                                  </p:stCondLst>
-                                  <p:childTnLst>
-                                    <p:set>
-                                      <p:cBhvr>
-                                        <p:cTn id="14" dur="1" fill="hold">
-                                          <p:stCondLst>
-                                            <p:cond delay="0"/>
-                                          </p:stCondLst>
-                                        </p:cTn>
-                                        <p:tgtEl>
-                                          <p:spTgt spid="30"/>
-                                        </p:tgtEl>
-                                        <p:attrNameLst>
-                                          <p:attrName>style.visibility</p:attrName>
-                                        </p:attrNameLst>
-                                      </p:cBhvr>
-                                      <p:to>
-                                        <p:strVal val="visible"/>
-                                      </p:to>
-                                    </p:set>
-                                  </p:childTnLst>
-                                </p:cTn>
-                              </p:par>
-                              <p:par>
-                                <p:cTn id="15" presetID="1" presetClass="entr" presetSubtype="0" fill="hold" grpId="0" nodeType="withEffect">
-                                  <p:stCondLst>
-                                    <p:cond delay="0"/>
-                                  </p:stCondLst>
-                                  <p:childTnLst>
-                                    <p:set>
-                                      <p:cBhvr>
-                                        <p:cTn id="16" dur="1" fill="hold">
-                                          <p:stCondLst>
-                                            <p:cond delay="0"/>
-                                          </p:stCondLst>
-                                        </p:cTn>
-                                        <p:tgtEl>
-                                          <p:spTgt spid="32"/>
-                                        </p:tgtEl>
-                                        <p:attrNameLst>
-                                          <p:attrName>style.visibility</p:attrName>
-                                        </p:attrNameLst>
-                                      </p:cBhvr>
-                                      <p:to>
-                                        <p:strVal val="visible"/>
-                                      </p:to>
-                                    </p:set>
-                                  </p:childTnLst>
-                                </p:cTn>
-                              </p:par>
-                              <p:par>
-                                <p:cTn id="17" presetID="1" presetClass="entr" presetSubtype="0" fill="hold" grpId="0" nodeType="withEffect">
-                                  <p:stCondLst>
-                                    <p:cond delay="0"/>
-                                  </p:stCondLst>
-                                  <p:childTnLst>
-                                    <p:set>
-                                      <p:cBhvr>
-                                        <p:cTn id="18" dur="1" fill="hold">
-                                          <p:stCondLst>
-                                            <p:cond delay="0"/>
-                                          </p:stCondLst>
-                                        </p:cTn>
-                                        <p:tgtEl>
-                                          <p:spTgt spid="33"/>
-                                        </p:tgtEl>
-                                        <p:attrNameLst>
-                                          <p:attrName>style.visibility</p:attrName>
-                                        </p:attrNameLst>
-                                      </p:cBhvr>
-                                      <p:to>
-                                        <p:strVal val="visible"/>
-                                      </p:to>
-                                    </p:set>
-                                  </p:childTnLst>
-                                </p:cTn>
-                              </p:par>
-                              <p:par>
-                                <p:cTn id="19" presetID="1" presetClass="entr" presetSubtype="0" fill="hold" grpId="0" nodeType="withEffect">
-                                  <p:stCondLst>
-                                    <p:cond delay="0"/>
-                                  </p:stCondLst>
-                                  <p:childTnLst>
-                                    <p:set>
-                                      <p:cBhvr>
-                                        <p:cTn id="20" dur="1" fill="hold">
-                                          <p:stCondLst>
-                                            <p:cond delay="0"/>
-                                          </p:stCondLst>
-                                        </p:cTn>
-                                        <p:tgtEl>
-                                          <p:spTgt spid="37"/>
-                                        </p:tgtEl>
-                                        <p:attrNameLst>
-                                          <p:attrName>style.visibility</p:attrName>
-                                        </p:attrNameLst>
-                                      </p:cBhvr>
-                                      <p:to>
-                                        <p:strVal val="visible"/>
-                                      </p:to>
-                                    </p:set>
-                                  </p:childTnLst>
-                                </p:cTn>
-                              </p:par>
-                              <p:par>
-                                <p:cTn id="21" presetID="1" presetClass="entr" presetSubtype="0" fill="hold" grpId="0" nodeType="withEffect">
-                                  <p:stCondLst>
-                                    <p:cond delay="0"/>
-                                  </p:stCondLst>
-                                  <p:childTnLst>
-                                    <p:set>
-                                      <p:cBhvr>
-                                        <p:cTn id="22" dur="1" fill="hold">
-                                          <p:stCondLst>
-                                            <p:cond delay="0"/>
-                                          </p:stCondLst>
-                                        </p:cTn>
-                                        <p:tgtEl>
-                                          <p:spTgt spid="38"/>
-                                        </p:tgtEl>
-                                        <p:attrNameLst>
-                                          <p:attrName>style.visibility</p:attrName>
-                                        </p:attrNameLst>
-                                      </p:cBhvr>
-                                      <p:to>
-                                        <p:strVal val="visible"/>
-                                      </p:to>
-                                    </p:set>
-                                  </p:childTnLst>
-                                </p:cTn>
-                              </p:par>
-                              <p:par>
-                                <p:cTn id="23" presetID="1" presetClass="entr" presetSubtype="0" fill="hold" grpId="0" nodeType="withEffect">
-                                  <p:stCondLst>
-                                    <p:cond delay="0"/>
-                                  </p:stCondLst>
-                                  <p:childTnLst>
-                                    <p:set>
-                                      <p:cBhvr>
-                                        <p:cTn id="24" dur="1" fill="hold">
-                                          <p:stCondLst>
-                                            <p:cond delay="0"/>
-                                          </p:stCondLst>
-                                        </p:cTn>
-                                        <p:tgtEl>
-                                          <p:spTgt spid="39"/>
-                                        </p:tgtEl>
-                                        <p:attrNameLst>
-                                          <p:attrName>style.visibility</p:attrName>
-                                        </p:attrNameLst>
-                                      </p:cBhvr>
-                                      <p:to>
-                                        <p:strVal val="visible"/>
-                                      </p:to>
-                                    </p:set>
-                                  </p:childTnLst>
-                                </p:cTn>
-                              </p:par>
-                              <p:par>
-                                <p:cTn id="25" presetID="1" presetClass="entr" presetSubtype="0" fill="hold" grpId="0" nodeType="withEffect">
-                                  <p:stCondLst>
-                                    <p:cond delay="0"/>
-                                  </p:stCondLst>
-                                  <p:childTnLst>
-                                    <p:set>
-                                      <p:cBhvr>
-                                        <p:cTn id="26" dur="1" fill="hold">
-                                          <p:stCondLst>
-                                            <p:cond delay="0"/>
-                                          </p:stCondLst>
-                                        </p:cTn>
-                                        <p:tgtEl>
-                                          <p:spTgt spid="40"/>
-                                        </p:tgtEl>
-                                        <p:attrNameLst>
-                                          <p:attrName>style.visibility</p:attrName>
-                                        </p:attrNameLst>
-                                      </p:cBhvr>
-                                      <p:to>
-                                        <p:strVal val="visible"/>
-                                      </p:to>
-                                    </p:set>
-                                  </p:childTnLst>
-                                </p:cTn>
-                              </p:par>
-                              <p:par>
-                                <p:cTn id="27" presetID="1" presetClass="entr" presetSubtype="0" fill="hold" grpId="0" nodeType="withEffect">
-                                  <p:stCondLst>
-                                    <p:cond delay="0"/>
-                                  </p:stCondLst>
-                                  <p:childTnLst>
-                                    <p:set>
-                                      <p:cBhvr>
-                                        <p:cTn id="28" dur="1" fill="hold">
-                                          <p:stCondLst>
-                                            <p:cond delay="0"/>
-                                          </p:stCondLst>
-                                        </p:cTn>
-                                        <p:tgtEl>
-                                          <p:spTgt spid="41"/>
-                                        </p:tgtEl>
-                                        <p:attrNameLst>
-                                          <p:attrName>style.visibility</p:attrName>
-                                        </p:attrNameLst>
-                                      </p:cBhvr>
-                                      <p:to>
-                                        <p:strVal val="visible"/>
-                                      </p:to>
-                                    </p:set>
-                                  </p:childTnLst>
-                                </p:cTn>
-                              </p:par>
-                              <p:par>
-                                <p:cTn id="29" presetID="1" presetClass="entr" presetSubtype="0" fill="hold" grpId="0" nodeType="withEffect">
-                                  <p:stCondLst>
-                                    <p:cond delay="0"/>
-                                  </p:stCondLst>
-                                  <p:childTnLst>
-                                    <p:set>
-                                      <p:cBhvr>
-                                        <p:cTn id="30" dur="1" fill="hold">
-                                          <p:stCondLst>
-                                            <p:cond delay="0"/>
-                                          </p:stCondLst>
-                                        </p:cTn>
-                                        <p:tgtEl>
-                                          <p:spTgt spid="42"/>
-                                        </p:tgtEl>
-                                        <p:attrNameLst>
-                                          <p:attrName>style.visibility</p:attrName>
-                                        </p:attrNameLst>
-                                      </p:cBhvr>
-                                      <p:to>
-                                        <p:strVal val="visible"/>
-                                      </p:to>
-                                    </p:set>
-                                  </p:childTnLst>
-                                </p:cTn>
-                              </p:par>
-                              <p:par>
-                                <p:cTn id="31" presetID="1" presetClass="entr" presetSubtype="0" fill="hold" grpId="0" nodeType="withEffect">
-                                  <p:stCondLst>
-                                    <p:cond delay="0"/>
-                                  </p:stCondLst>
-                                  <p:childTnLst>
-                                    <p:set>
-                                      <p:cBhvr>
-                                        <p:cTn id="32" dur="1" fill="hold">
-                                          <p:stCondLst>
-                                            <p:cond delay="0"/>
-                                          </p:stCondLst>
-                                        </p:cTn>
-                                        <p:tgtEl>
-                                          <p:spTgt spid="43"/>
-                                        </p:tgtEl>
-                                        <p:attrNameLst>
-                                          <p:attrName>style.visibility</p:attrName>
-                                        </p:attrNameLst>
-                                      </p:cBhvr>
-                                      <p:to>
-                                        <p:strVal val="visible"/>
-                                      </p:to>
-                                    </p:set>
-                                  </p:childTnLst>
-                                </p:cTn>
-                              </p:par>
-                              <p:par>
-                                <p:cTn id="33" presetID="1" presetClass="entr" presetSubtype="0" fill="hold" grpId="0" nodeType="withEffect">
-                                  <p:stCondLst>
-                                    <p:cond delay="0"/>
-                                  </p:stCondLst>
-                                  <p:childTnLst>
-                                    <p:set>
-                                      <p:cBhvr>
-                                        <p:cTn id="34" dur="1" fill="hold">
-                                          <p:stCondLst>
-                                            <p:cond delay="0"/>
-                                          </p:stCondLst>
-                                        </p:cTn>
-                                        <p:tgtEl>
-                                          <p:spTgt spid="44"/>
-                                        </p:tgtEl>
-                                        <p:attrNameLst>
-                                          <p:attrName>style.visibility</p:attrName>
-                                        </p:attrNameLst>
-                                      </p:cBhvr>
-                                      <p:to>
-                                        <p:strVal val="visible"/>
-                                      </p:to>
-                                    </p:set>
-                                  </p:childTnLst>
-                                </p:cTn>
-                              </p:par>
-                              <p:par>
-                                <p:cTn id="35" presetID="1" presetClass="entr" presetSubtype="0" fill="hold" grpId="0" nodeType="withEffect">
-                                  <p:stCondLst>
-                                    <p:cond delay="0"/>
-                                  </p:stCondLst>
-                                  <p:childTnLst>
-                                    <p:set>
-                                      <p:cBhvr>
-                                        <p:cTn id="36" dur="1" fill="hold">
-                                          <p:stCondLst>
-                                            <p:cond delay="0"/>
-                                          </p:stCondLst>
-                                        </p:cTn>
-                                        <p:tgtEl>
-                                          <p:spTgt spid="45"/>
-                                        </p:tgtEl>
-                                        <p:attrNameLst>
-                                          <p:attrName>style.visibility</p:attrName>
-                                        </p:attrNameLst>
-                                      </p:cBhvr>
-                                      <p:to>
-                                        <p:strVal val="visible"/>
-                                      </p:to>
-                                    </p:set>
-                                  </p:childTnLst>
-                                </p:cTn>
-                              </p:par>
-                              <p:par>
-                                <p:cTn id="37" presetID="1" presetClass="entr" presetSubtype="0" fill="hold" grpId="0" nodeType="withEffect">
-                                  <p:stCondLst>
-                                    <p:cond delay="0"/>
-                                  </p:stCondLst>
-                                  <p:childTnLst>
-                                    <p:set>
-                                      <p:cBhvr>
-                                        <p:cTn id="38" dur="1" fill="hold">
-                                          <p:stCondLst>
-                                            <p:cond delay="0"/>
-                                          </p:stCondLst>
-                                        </p:cTn>
-                                        <p:tgtEl>
-                                          <p:spTgt spid="46"/>
-                                        </p:tgtEl>
-                                        <p:attrNameLst>
-                                          <p:attrName>style.visibility</p:attrName>
-                                        </p:attrNameLst>
-                                      </p:cBhvr>
-                                      <p:to>
-                                        <p:strVal val="visible"/>
-                                      </p:to>
-                                    </p:set>
-                                  </p:childTnLst>
-                                </p:cTn>
-                              </p:par>
-                              <p:par>
-                                <p:cTn id="39" presetID="1" presetClass="entr" presetSubtype="0" fill="hold" grpId="0" nodeType="withEffect">
-                                  <p:stCondLst>
-                                    <p:cond delay="0"/>
-                                  </p:stCondLst>
-                                  <p:childTnLst>
-                                    <p:set>
-                                      <p:cBhvr>
-                                        <p:cTn id="40" dur="1" fill="hold">
-                                          <p:stCondLst>
-                                            <p:cond delay="0"/>
-                                          </p:stCondLst>
-                                        </p:cTn>
-                                        <p:tgtEl>
-                                          <p:spTgt spid="47"/>
-                                        </p:tgtEl>
-                                        <p:attrNameLst>
-                                          <p:attrName>style.visibility</p:attrName>
-                                        </p:attrNameLst>
-                                      </p:cBhvr>
-                                      <p:to>
-                                        <p:strVal val="visible"/>
-                                      </p:to>
-                                    </p:set>
-                                  </p:childTnLst>
-                                </p:cTn>
-                              </p:par>
-                              <p:par>
-                                <p:cTn id="41" presetID="1" presetClass="entr" presetSubtype="0" fill="hold" grpId="0" nodeType="withEffect">
-                                  <p:stCondLst>
-                                    <p:cond delay="0"/>
-                                  </p:stCondLst>
-                                  <p:childTnLst>
-                                    <p:set>
-                                      <p:cBhvr>
-                                        <p:cTn id="42" dur="1" fill="hold">
-                                          <p:stCondLst>
-                                            <p:cond delay="0"/>
-                                          </p:stCondLst>
-                                        </p:cTn>
-                                        <p:tgtEl>
-                                          <p:spTgt spid="48"/>
-                                        </p:tgtEl>
-                                        <p:attrNameLst>
-                                          <p:attrName>style.visibility</p:attrName>
-                                        </p:attrNameLst>
-                                      </p:cBhvr>
-                                      <p:to>
-                                        <p:strVal val="visible"/>
-                                      </p:to>
-                                    </p:set>
-                                  </p:childTnLst>
-                                </p:cTn>
-                              </p:par>
-                              <p:par>
-                                <p:cTn id="43" presetID="1" presetClass="entr" presetSubtype="0" fill="hold" grpId="0" nodeType="withEffect">
-                                  <p:stCondLst>
-                                    <p:cond delay="0"/>
-                                  </p:stCondLst>
-                                  <p:childTnLst>
-                                    <p:set>
-                                      <p:cBhvr>
-                                        <p:cTn id="44" dur="1" fill="hold">
-                                          <p:stCondLst>
-                                            <p:cond delay="0"/>
-                                          </p:stCondLst>
-                                        </p:cTn>
-                                        <p:tgtEl>
-                                          <p:spTgt spid="49"/>
-                                        </p:tgtEl>
-                                        <p:attrNameLst>
-                                          <p:attrName>style.visibility</p:attrName>
-                                        </p:attrNameLst>
-                                      </p:cBhvr>
-                                      <p:to>
-                                        <p:strVal val="visible"/>
-                                      </p:to>
-                                    </p:set>
-                                  </p:childTnLst>
-                                </p:cTn>
-                              </p:par>
-                              <p:par>
-                                <p:cTn id="45" presetID="1" presetClass="entr" presetSubtype="0" fill="hold" grpId="0" nodeType="withEffect">
-                                  <p:stCondLst>
-                                    <p:cond delay="0"/>
-                                  </p:stCondLst>
-                                  <p:childTnLst>
-                                    <p:set>
-                                      <p:cBhvr>
-                                        <p:cTn id="46" dur="1" fill="hold">
-                                          <p:stCondLst>
-                                            <p:cond delay="0"/>
-                                          </p:stCondLst>
-                                        </p:cTn>
-                                        <p:tgtEl>
-                                          <p:spTgt spid="51"/>
-                                        </p:tgtEl>
-                                        <p:attrNameLst>
-                                          <p:attrName>style.visibility</p:attrName>
-                                        </p:attrNameLst>
-                                      </p:cBhvr>
-                                      <p:to>
-                                        <p:strVal val="visible"/>
-                                      </p:to>
-                                    </p:set>
-                                  </p:childTnLst>
-                                </p:cTn>
-                              </p:par>
-                              <p:par>
-                                <p:cTn id="47" presetID="1" presetClass="entr" presetSubtype="0" fill="hold" grpId="0" nodeType="withEffect">
-                                  <p:stCondLst>
-                                    <p:cond delay="0"/>
-                                  </p:stCondLst>
-                                  <p:childTnLst>
-                                    <p:set>
-                                      <p:cBhvr>
-                                        <p:cTn id="48" dur="1" fill="hold">
-                                          <p:stCondLst>
-                                            <p:cond delay="0"/>
-                                          </p:stCondLst>
-                                        </p:cTn>
-                                        <p:tgtEl>
-                                          <p:spTgt spid="52"/>
-                                        </p:tgtEl>
-                                        <p:attrNameLst>
-                                          <p:attrName>style.visibility</p:attrName>
-                                        </p:attrNameLst>
-                                      </p:cBhvr>
-                                      <p:to>
-                                        <p:strVal val="visible"/>
-                                      </p:to>
-                                    </p:set>
-                                  </p:childTnLst>
-                                </p:cTn>
-                              </p:par>
-                              <p:par>
-                                <p:cTn id="49" presetID="1" presetClass="entr" presetSubtype="0" fill="hold" grpId="0" nodeType="withEffect">
-                                  <p:stCondLst>
-                                    <p:cond delay="0"/>
-                                  </p:stCondLst>
-                                  <p:childTnLst>
-                                    <p:set>
-                                      <p:cBhvr>
-                                        <p:cTn id="50" dur="1" fill="hold">
-                                          <p:stCondLst>
-                                            <p:cond delay="0"/>
-                                          </p:stCondLst>
-                                        </p:cTn>
-                                        <p:tgtEl>
-                                          <p:spTgt spid="53"/>
-                                        </p:tgtEl>
-                                        <p:attrNameLst>
-                                          <p:attrName>style.visibility</p:attrName>
-                                        </p:attrNameLst>
-                                      </p:cBhvr>
-                                      <p:to>
-                                        <p:strVal val="visible"/>
-                                      </p:to>
-                                    </p:set>
-                                  </p:childTnLst>
-                                </p:cTn>
-                              </p:par>
-                              <p:par>
-                                <p:cTn id="51" presetID="1" presetClass="entr" presetSubtype="0" fill="hold" grpId="0" nodeType="withEffect">
-                                  <p:stCondLst>
-                                    <p:cond delay="0"/>
-                                  </p:stCondLst>
-                                  <p:childTnLst>
-                                    <p:set>
-                                      <p:cBhvr>
-                                        <p:cTn id="52" dur="1" fill="hold">
-                                          <p:stCondLst>
-                                            <p:cond delay="0"/>
-                                          </p:stCondLst>
-                                        </p:cTn>
-                                        <p:tgtEl>
-                                          <p:spTgt spid="54"/>
-                                        </p:tgtEl>
-                                        <p:attrNameLst>
-                                          <p:attrName>style.visibility</p:attrName>
-                                        </p:attrNameLst>
-                                      </p:cBhvr>
-                                      <p:to>
-                                        <p:strVal val="visible"/>
-                                      </p:to>
-                                    </p:set>
-                                  </p:childTnLst>
-                                </p:cTn>
-                              </p:par>
-                            </p:childTnLst>
-                          </p:cTn>
-                        </p:par>
-                      </p:childTnLst>
-                    </p:cTn>
-                  </p:par>
-                </p:childTnLst>
-              </p:cTn>
-              <p:prevCondLst>
-                <p:cond evt="onPrev" delay="0">
-                  <p:tgtEl>
-                    <p:sldTgt/>
-                  </p:tgtEl>
-                </p:cond>
-              </p:prevCondLst>
-              <p:nextCondLst>
-                <p:cond evt="onNext" delay="0">
-                  <p:tgtEl>
-                    <p:sldTgt/>
-                  </p:tgtEl>
-                </p:cond>
-              </p:nextCondLst>
-            </p:seq>
-          </p:childTnLst>
-        </p:cTn>
-      </p:par>
-    </p:tnLst>
-    <p:bldLst>
-      <p:bldP spid="20" grpId="0" animBg="1"/>
-      <p:bldP spid="21" grpId="0" animBg="1"/>
-      <p:bldP spid="23" grpId="0" animBg="1"/>
-      <p:bldP spid="25" grpId="0" animBg="1"/>
-      <p:bldP spid="30" grpId="0" animBg="1"/>
-      <p:bldP spid="32" grpId="0" animBg="1"/>
-      <p:bldP spid="33" grpId="0" animBg="1"/>
-      <p:bldP spid="37" grpId="0" animBg="1"/>
-      <p:bldP spid="38" grpId="0" animBg="1"/>
-      <p:bldP spid="39" grpId="0" animBg="1"/>
-      <p:bldP spid="40" grpId="0" animBg="1"/>
-      <p:bldP spid="41" grpId="0" animBg="1"/>
-      <p:bldP spid="42" grpId="0" animBg="1"/>
-      <p:bldP spid="43" grpId="0" animBg="1"/>
-      <p:bldP spid="44" grpId="0" animBg="1"/>
-      <p:bldP spid="45" grpId="0" animBg="1"/>
-      <p:bldP spid="46" grpId="0" animBg="1"/>
-      <p:bldP spid="47" grpId="0" animBg="1"/>
-      <p:bldP spid="48" grpId="0" animBg="1"/>
-      <p:bldP spid="49" grpId="0" animBg="1"/>
-      <p:bldP spid="51" grpId="0"/>
-      <p:bldP spid="52" grpId="0"/>
-      <p:bldP spid="53" grpId="0"/>
-      <p:bldP spid="54" grpId="0"/>
-    </p:bldLst>
-  </p:timing>
 </p:sld>
 </file>
 
@@ -18045,8 +16705,8 @@
         </p:nvSpPr>
         <p:spPr>
           <a:xfrm>
-            <a:off x="1883899" y="5830808"/>
-            <a:ext cx="3682654" cy="369332"/>
+            <a:off x="1992566" y="5849953"/>
+            <a:ext cx="9792286" cy="1200329"/>
           </a:xfrm>
           <a:prstGeom prst="rect">
             <a:avLst/>
@@ -18066,6 +16726,23 @@
               </a:rPr>
               <a:t>Clinical + manual imaging data</a:t>
             </a:r>
+          </a:p>
+          <a:p>
+            <a:endParaRPr lang="en-US" b="1" dirty="0">
+              <a:latin typeface="Arial" panose="020B0604020202020204" pitchFamily="34" charset="0"/>
+              <a:cs typeface="Arial" panose="020B0604020202020204" pitchFamily="34" charset="0"/>
+            </a:endParaRPr>
+          </a:p>
+          <a:p>
+            <a:r>
+              <a:rPr lang="en-US" b="1" dirty="0">
+                <a:latin typeface="Arial" panose="020B0604020202020204" pitchFamily="34" charset="0"/>
+                <a:cs typeface="Arial" panose="020B0604020202020204" pitchFamily="34" charset="0"/>
+              </a:rPr>
+              <a:t>Next step: try: clinical alone, clinical + manual imaging, clinical + rad, manual + rad</a:t>
+            </a:r>
+          </a:p>
+          <a:p>
             <a:endParaRPr lang="en-US" b="1" dirty="0"/>
           </a:p>
         </p:txBody>
@@ -18641,10 +17318,10 @@
       </p:cxnSp>
       <p:sp>
         <p:nvSpPr>
-          <p:cNvPr id="25" name="Rectangle 24">
-            <a:extLst>
-              <a:ext uri="{FF2B5EF4-FFF2-40B4-BE49-F238E27FC236}">
-                <a16:creationId xmlns:a16="http://schemas.microsoft.com/office/drawing/2014/main" id="{F6D6F1C6-7C37-DCF5-C675-626711F1712C}"/>
+          <p:cNvPr id="26" name="Rectangle 25">
+            <a:extLst>
+              <a:ext uri="{FF2B5EF4-FFF2-40B4-BE49-F238E27FC236}">
+                <a16:creationId xmlns:a16="http://schemas.microsoft.com/office/drawing/2014/main" id="{0E8705C1-4DB2-AA93-223F-9C0B44C9E1CF}"/>
               </a:ext>
             </a:extLst>
           </p:cNvPr>
@@ -18653,8 +17330,8 @@
         </p:nvSpPr>
         <p:spPr>
           <a:xfrm>
-            <a:off x="4102357" y="1630428"/>
-            <a:ext cx="572568" cy="1183582"/>
+            <a:off x="3010793" y="3511960"/>
+            <a:ext cx="1091563" cy="1183582"/>
           </a:xfrm>
           <a:prstGeom prst="rect">
             <a:avLst/>
@@ -18693,10 +17370,10 @@
       </p:sp>
       <p:sp>
         <p:nvSpPr>
-          <p:cNvPr id="26" name="Rectangle 25">
-            <a:extLst>
-              <a:ext uri="{FF2B5EF4-FFF2-40B4-BE49-F238E27FC236}">
-                <a16:creationId xmlns:a16="http://schemas.microsoft.com/office/drawing/2014/main" id="{0E8705C1-4DB2-AA93-223F-9C0B44C9E1CF}"/>
+          <p:cNvPr id="27" name="Rectangle 26">
+            <a:extLst>
+              <a:ext uri="{FF2B5EF4-FFF2-40B4-BE49-F238E27FC236}">
+                <a16:creationId xmlns:a16="http://schemas.microsoft.com/office/drawing/2014/main" id="{13758505-D416-1791-A80B-89C428269D1E}"/>
               </a:ext>
             </a:extLst>
           </p:cNvPr>
@@ -18705,8 +17382,8 @@
         </p:nvSpPr>
         <p:spPr>
           <a:xfrm>
-            <a:off x="3010793" y="3511960"/>
-            <a:ext cx="1091563" cy="1183582"/>
+            <a:off x="5763964" y="1621882"/>
+            <a:ext cx="572568" cy="1183582"/>
           </a:xfrm>
           <a:prstGeom prst="rect">
             <a:avLst/>
@@ -18745,10 +17422,57 @@
       </p:sp>
       <p:sp>
         <p:nvSpPr>
-          <p:cNvPr id="27" name="Rectangle 26">
-            <a:extLst>
-              <a:ext uri="{FF2B5EF4-FFF2-40B4-BE49-F238E27FC236}">
-                <a16:creationId xmlns:a16="http://schemas.microsoft.com/office/drawing/2014/main" id="{13758505-D416-1791-A80B-89C428269D1E}"/>
+          <p:cNvPr id="28" name="TextBox 27">
+            <a:extLst>
+              <a:ext uri="{FF2B5EF4-FFF2-40B4-BE49-F238E27FC236}">
+                <a16:creationId xmlns:a16="http://schemas.microsoft.com/office/drawing/2014/main" id="{4D1E33A5-702C-D695-E1A1-C4031E2D4BA0}"/>
+              </a:ext>
+            </a:extLst>
+          </p:cNvPr>
+          <p:cNvSpPr txBox="1"/>
+          <p:nvPr/>
+        </p:nvSpPr>
+        <p:spPr>
+          <a:xfrm>
+            <a:off x="112913" y="987913"/>
+            <a:ext cx="1098913" cy="900246"/>
+          </a:xfrm>
+          <a:prstGeom prst="rect">
+            <a:avLst/>
+          </a:prstGeom>
+          <a:noFill/>
+        </p:spPr>
+        <p:txBody>
+          <a:bodyPr wrap="square">
+            <a:spAutoFit/>
+          </a:bodyPr>
+          <a:lstStyle/>
+          <a:p>
+            <a:pPr algn="ctr"/>
+            <a:r>
+              <a:rPr lang="en-US" sz="1050" b="1" dirty="0">
+                <a:solidFill>
+                  <a:srgbClr val="FF0000"/>
+                </a:solidFill>
+                <a:latin typeface="Arial" panose="020B0604020202020204" pitchFamily="34" charset="0"/>
+                <a:cs typeface="Arial" panose="020B0604020202020204" pitchFamily="34" charset="0"/>
+              </a:rPr>
+              <a:t>This is post-initial filter so most features are thrown out already!</a:t>
+            </a:r>
+            <a:endParaRPr lang="en-US" sz="1050" b="1" dirty="0">
+              <a:solidFill>
+                <a:srgbClr val="FF0000"/>
+              </a:solidFill>
+            </a:endParaRPr>
+          </a:p>
+        </p:txBody>
+      </p:sp>
+      <p:sp>
+        <p:nvSpPr>
+          <p:cNvPr id="29" name="Rectangle 28">
+            <a:extLst>
+              <a:ext uri="{FF2B5EF4-FFF2-40B4-BE49-F238E27FC236}">
+                <a16:creationId xmlns:a16="http://schemas.microsoft.com/office/drawing/2014/main" id="{D83B6B09-72E0-9F86-6F05-5D60305DF003}"/>
               </a:ext>
             </a:extLst>
           </p:cNvPr>
@@ -18757,8 +17481,8 @@
         </p:nvSpPr>
         <p:spPr>
           <a:xfrm>
-            <a:off x="5763964" y="1621882"/>
-            <a:ext cx="572568" cy="1183582"/>
+            <a:off x="3504788" y="5585389"/>
+            <a:ext cx="537373" cy="1183582"/>
           </a:xfrm>
           <a:prstGeom prst="rect">
             <a:avLst/>
@@ -18795,109 +17519,281 @@
           </a:p>
         </p:txBody>
       </p:sp>
-      <p:sp>
-        <p:nvSpPr>
-          <p:cNvPr id="28" name="TextBox 27">
-            <a:extLst>
-              <a:ext uri="{FF2B5EF4-FFF2-40B4-BE49-F238E27FC236}">
-                <a16:creationId xmlns:a16="http://schemas.microsoft.com/office/drawing/2014/main" id="{4D1E33A5-702C-D695-E1A1-C4031E2D4BA0}"/>
-              </a:ext>
-            </a:extLst>
-          </p:cNvPr>
-          <p:cNvSpPr txBox="1"/>
-          <p:nvPr/>
-        </p:nvSpPr>
-        <p:spPr>
-          <a:xfrm>
-            <a:off x="112913" y="987913"/>
-            <a:ext cx="1098913" cy="900246"/>
-          </a:xfrm>
-          <a:prstGeom prst="rect">
-            <a:avLst/>
-          </a:prstGeom>
-          <a:noFill/>
-        </p:spPr>
-        <p:txBody>
-          <a:bodyPr wrap="square">
-            <a:spAutoFit/>
-          </a:bodyPr>
-          <a:lstStyle/>
-          <a:p>
-            <a:pPr algn="ctr"/>
-            <a:r>
-              <a:rPr lang="en-US" sz="1050" b="1" dirty="0">
-                <a:solidFill>
-                  <a:srgbClr val="FF0000"/>
-                </a:solidFill>
-                <a:latin typeface="Arial" panose="020B0604020202020204" pitchFamily="34" charset="0"/>
-                <a:cs typeface="Arial" panose="020B0604020202020204" pitchFamily="34" charset="0"/>
-              </a:rPr>
-              <a:t>This is post-initial filter so most features are thrown out already!</a:t>
-            </a:r>
-            <a:endParaRPr lang="en-US" sz="1050" b="1" dirty="0">
-              <a:solidFill>
-                <a:srgbClr val="FF0000"/>
-              </a:solidFill>
-            </a:endParaRPr>
-          </a:p>
-        </p:txBody>
-      </p:sp>
-      <p:sp>
-        <p:nvSpPr>
-          <p:cNvPr id="29" name="Rectangle 28">
-            <a:extLst>
-              <a:ext uri="{FF2B5EF4-FFF2-40B4-BE49-F238E27FC236}">
-                <a16:creationId xmlns:a16="http://schemas.microsoft.com/office/drawing/2014/main" id="{D83B6B09-72E0-9F86-6F05-5D60305DF003}"/>
-              </a:ext>
-            </a:extLst>
-          </p:cNvPr>
-          <p:cNvSpPr/>
-          <p:nvPr/>
-        </p:nvSpPr>
-        <p:spPr>
-          <a:xfrm>
-            <a:off x="3504788" y="5585389"/>
-            <a:ext cx="537373" cy="1183582"/>
-          </a:xfrm>
-          <a:prstGeom prst="rect">
-            <a:avLst/>
-          </a:prstGeom>
-          <a:noFill/>
-          <a:ln>
-            <a:solidFill>
-              <a:srgbClr val="C00000"/>
-            </a:solidFill>
-          </a:ln>
-        </p:spPr>
-        <p:style>
-          <a:lnRef idx="2">
-            <a:schemeClr val="accent1">
-              <a:shade val="50000"/>
-            </a:schemeClr>
-          </a:lnRef>
-          <a:fillRef idx="1">
-            <a:schemeClr val="accent1"/>
-          </a:fillRef>
-          <a:effectRef idx="0">
-            <a:schemeClr val="accent1"/>
-          </a:effectRef>
-          <a:fontRef idx="minor">
-            <a:schemeClr val="lt1"/>
-          </a:fontRef>
-        </p:style>
-        <p:txBody>
-          <a:bodyPr rtlCol="0" anchor="ctr"/>
-          <a:lstStyle/>
-          <a:p>
-            <a:pPr algn="ctr"/>
-            <a:endParaRPr lang="en-US"/>
-          </a:p>
-        </p:txBody>
-      </p:sp>
     </p:spTree>
     <p:extLst>
       <p:ext uri="{BB962C8B-B14F-4D97-AF65-F5344CB8AC3E}">
         <p14:creationId xmlns:p14="http://schemas.microsoft.com/office/powerpoint/2010/main" val="2646087430"/>
+      </p:ext>
+    </p:extLst>
+  </p:cSld>
+  <p:clrMapOvr>
+    <a:masterClrMapping/>
+  </p:clrMapOvr>
+</p:sld>
+</file>
+
+<file path=ppt/slides/slide25.xml><?xml version="1.0" encoding="utf-8"?>
+<p:sld xmlns:a="http://schemas.openxmlformats.org/drawingml/2006/main" xmlns:r="http://schemas.openxmlformats.org/officeDocument/2006/relationships" xmlns:p="http://schemas.openxmlformats.org/presentationml/2006/main">
+  <p:cSld>
+    <p:spTree>
+      <p:nvGrpSpPr>
+        <p:cNvPr id="1" name=""/>
+        <p:cNvGrpSpPr/>
+        <p:nvPr/>
+      </p:nvGrpSpPr>
+      <p:grpSpPr>
+        <a:xfrm>
+          <a:off x="0" y="0"/>
+          <a:ext cx="0" cy="0"/>
+          <a:chOff x="0" y="0"/>
+          <a:chExt cx="0" cy="0"/>
+        </a:xfrm>
+      </p:grpSpPr>
+      <p:sp>
+        <p:nvSpPr>
+          <p:cNvPr id="2" name="Title 1">
+            <a:extLst>
+              <a:ext uri="{FF2B5EF4-FFF2-40B4-BE49-F238E27FC236}">
+                <a16:creationId xmlns:a16="http://schemas.microsoft.com/office/drawing/2014/main" id="{6F080E6E-7D94-EB2B-53FD-347610EDF6F4}"/>
+              </a:ext>
+            </a:extLst>
+          </p:cNvPr>
+          <p:cNvSpPr>
+            <a:spLocks noGrp="1"/>
+          </p:cNvSpPr>
+          <p:nvPr>
+            <p:ph type="title"/>
+          </p:nvPr>
+        </p:nvSpPr>
+        <p:spPr/>
+        <p:txBody>
+          <a:bodyPr/>
+          <a:lstStyle/>
+          <a:p>
+            <a:r>
+              <a:rPr lang="en-US" dirty="0"/>
+              <a:t>Next steps</a:t>
+            </a:r>
+          </a:p>
+        </p:txBody>
+      </p:sp>
+      <p:sp>
+        <p:nvSpPr>
+          <p:cNvPr id="3" name="Content Placeholder 2">
+            <a:extLst>
+              <a:ext uri="{FF2B5EF4-FFF2-40B4-BE49-F238E27FC236}">
+                <a16:creationId xmlns:a16="http://schemas.microsoft.com/office/drawing/2014/main" id="{3A14B6B5-2ED7-4A51-A262-3644EF4264BE}"/>
+              </a:ext>
+            </a:extLst>
+          </p:cNvPr>
+          <p:cNvSpPr>
+            <a:spLocks noGrp="1"/>
+          </p:cNvSpPr>
+          <p:nvPr>
+            <p:ph idx="1"/>
+          </p:nvPr>
+        </p:nvSpPr>
+        <p:spPr/>
+        <p:txBody>
+          <a:bodyPr>
+            <a:normAutofit lnSpcReduction="10000"/>
+          </a:bodyPr>
+          <a:lstStyle/>
+          <a:p>
+            <a:r>
+              <a:rPr lang="en-US" dirty="0"/>
+              <a:t>Look at “hard” MACE events (death/</a:t>
+            </a:r>
+            <a:r>
+              <a:rPr lang="en-US" dirty="0" err="1"/>
+              <a:t>acs</a:t>
+            </a:r>
+            <a:r>
+              <a:rPr lang="en-US" dirty="0"/>
+              <a:t>/stroke/</a:t>
+            </a:r>
+            <a:r>
+              <a:rPr lang="en-US" dirty="0" err="1"/>
+              <a:t>tia</a:t>
+            </a:r>
+            <a:r>
+              <a:rPr lang="en-US" dirty="0"/>
+              <a:t>/</a:t>
+            </a:r>
+            <a:r>
+              <a:rPr lang="en-US" dirty="0" err="1"/>
+              <a:t>cea</a:t>
+            </a:r>
+            <a:r>
+              <a:rPr lang="en-US" dirty="0"/>
+              <a:t> instead of death/</a:t>
+            </a:r>
+            <a:r>
+              <a:rPr lang="en-US" dirty="0" err="1"/>
+              <a:t>acs</a:t>
+            </a:r>
+            <a:r>
+              <a:rPr lang="en-US" dirty="0"/>
+              <a:t>/stroke/</a:t>
+            </a:r>
+            <a:r>
+              <a:rPr lang="en-US" dirty="0" err="1"/>
+              <a:t>tia</a:t>
+            </a:r>
+            <a:r>
+              <a:rPr lang="en-US" dirty="0"/>
+              <a:t>/</a:t>
+            </a:r>
+            <a:r>
+              <a:rPr lang="en-US" dirty="0" err="1"/>
+              <a:t>cea</a:t>
+            </a:r>
+            <a:r>
+              <a:rPr lang="en-US" dirty="0"/>
+              <a:t>/</a:t>
+            </a:r>
+            <a:r>
+              <a:rPr lang="en-US" dirty="0" err="1"/>
+              <a:t>cabg</a:t>
+            </a:r>
+            <a:r>
+              <a:rPr lang="en-US" dirty="0"/>
+              <a:t>/</a:t>
+            </a:r>
+            <a:r>
+              <a:rPr lang="en-US" dirty="0" err="1"/>
+              <a:t>pci</a:t>
+            </a:r>
+            <a:r>
+              <a:rPr lang="en-US" dirty="0"/>
+              <a:t>)</a:t>
+            </a:r>
+          </a:p>
+          <a:p>
+            <a:pPr lvl="1"/>
+            <a:r>
+              <a:rPr lang="en-US" dirty="0"/>
+              <a:t>Only 78 events, probably not enough (</a:t>
+            </a:r>
+            <a:r>
+              <a:rPr lang="en-US" dirty="0" err="1"/>
+              <a:t>ricky</a:t>
+            </a:r>
+            <a:r>
+              <a:rPr lang="en-US" dirty="0"/>
+              <a:t>)</a:t>
+            </a:r>
+          </a:p>
+          <a:p>
+            <a:r>
+              <a:rPr lang="en-US" dirty="0"/>
+              <a:t>Multivariate analysis</a:t>
+            </a:r>
+          </a:p>
+          <a:p>
+            <a:pPr lvl="1"/>
+            <a:r>
+              <a:rPr lang="en-US" dirty="0"/>
+              <a:t>Correlation ratio heatmap (</a:t>
+            </a:r>
+            <a:r>
+              <a:rPr lang="en-US" dirty="0" err="1"/>
+              <a:t>ricky</a:t>
+            </a:r>
+            <a:r>
+              <a:rPr lang="en-US" dirty="0"/>
+              <a:t>)</a:t>
+            </a:r>
+          </a:p>
+          <a:p>
+            <a:r>
+              <a:rPr lang="en-US" dirty="0"/>
+              <a:t>Look at different combinations</a:t>
+            </a:r>
+          </a:p>
+          <a:p>
+            <a:pPr lvl="1"/>
+            <a:r>
+              <a:rPr lang="en-US" dirty="0"/>
+              <a:t>Clin </a:t>
+            </a:r>
+            <a:r>
+              <a:rPr lang="en-US" dirty="0" err="1"/>
+              <a:t>hx</a:t>
+            </a:r>
+            <a:r>
+              <a:rPr lang="en-US" dirty="0"/>
+              <a:t>, clin </a:t>
+            </a:r>
+            <a:r>
+              <a:rPr lang="en-US" dirty="0" err="1"/>
+              <a:t>hx</a:t>
+            </a:r>
+            <a:r>
+              <a:rPr lang="en-US" dirty="0"/>
+              <a:t> + manual imaging, manual imaging only, clin </a:t>
+            </a:r>
+            <a:r>
+              <a:rPr lang="en-US" dirty="0" err="1"/>
+              <a:t>hx</a:t>
+            </a:r>
+            <a:r>
+              <a:rPr lang="en-US" dirty="0"/>
+              <a:t> + radiomics, clin </a:t>
+            </a:r>
+            <a:r>
+              <a:rPr lang="en-US" dirty="0" err="1"/>
+              <a:t>hx</a:t>
+            </a:r>
+            <a:r>
+              <a:rPr lang="en-US" dirty="0"/>
+              <a:t> + manual imaging + radiomics (</a:t>
+            </a:r>
+            <a:r>
+              <a:rPr lang="en-US" dirty="0" err="1"/>
+              <a:t>ricky</a:t>
+            </a:r>
+            <a:r>
+              <a:rPr lang="en-US" dirty="0"/>
+              <a:t> to send combinations, </a:t>
+            </a:r>
+            <a:r>
+              <a:rPr lang="en-US" dirty="0" err="1"/>
+              <a:t>ramtin</a:t>
+            </a:r>
+            <a:r>
+              <a:rPr lang="en-US" dirty="0"/>
+              <a:t> to re-run SVM)</a:t>
+            </a:r>
+          </a:p>
+          <a:p>
+            <a:r>
+              <a:rPr lang="en-US" dirty="0"/>
+              <a:t>Feature </a:t>
+            </a:r>
+            <a:r>
+              <a:rPr lang="en-US" dirty="0" err="1"/>
+              <a:t>importances</a:t>
+            </a:r>
+            <a:r>
+              <a:rPr lang="en-US" dirty="0"/>
+              <a:t> within cross-validation loop to get avg and standard distribution (</a:t>
+            </a:r>
+            <a:r>
+              <a:rPr lang="en-US" dirty="0" err="1"/>
+              <a:t>ramtin</a:t>
+            </a:r>
+            <a:r>
+              <a:rPr lang="en-US" dirty="0"/>
+              <a:t>)</a:t>
+            </a:r>
+          </a:p>
+        </p:txBody>
+      </p:sp>
+    </p:spTree>
+    <p:extLst>
+      <p:ext uri="{BB962C8B-B14F-4D97-AF65-F5344CB8AC3E}">
+        <p14:creationId xmlns:p14="http://schemas.microsoft.com/office/powerpoint/2010/main" val="3095596456"/>
       </p:ext>
     </p:extLst>
   </p:cSld>

</xml_diff>